<commit_message>
Create Readme & Powerpoint
Ajout du readme du projet et correction du powerpoint
</commit_message>
<xml_diff>
--- a/Projet 1 - Démarrez votre formation de AI Engineer/Presentation.pptx
+++ b/Projet 1 - Démarrez votre formation de AI Engineer/Presentation.pptx
@@ -246,7 +246,7 @@
             <a:pPr rtl="0"/>
             <a:fld id="{CEC443D7-B39A-4082-ACDA-AF77E4B4529B}" type="datetime1">
               <a:rPr lang="fr-FR" smtClean="0"/>
-              <a:t>13/09/2024</a:t>
+              <a:t>17/09/2024</a:t>
             </a:fld>
             <a:endParaRPr lang="fr-FR" dirty="0"/>
           </a:p>
@@ -427,7 +427,7 @@
             <a:fld id="{F06201AB-AE6E-4BD6-8881-470FABF8AC15}" type="datetime1">
               <a:rPr lang="fr-FR" smtClean="0"/>
               <a:pPr/>
-              <a:t>13/09/2024</a:t>
+              <a:t>17/09/2024</a:t>
             </a:fld>
             <a:endParaRPr lang="fr-FR" dirty="0"/>
           </a:p>
@@ -13100,8 +13100,13 @@
             <a:pPr algn="l" rtl="0"/>
             <a:r>
               <a:rPr lang="fr-FR" sz="2000" dirty="0"/>
-              <a:t>Projet 6 : 30/05/2025              Projet 12 : 06/02/26/026 </a:t>
+              <a:t>Projet 6 : 30/05/2025              Projet 12 </a:t>
             </a:r>
+            <a:r>
+              <a:rPr lang="fr-FR" sz="2000"/>
+              <a:t>: 06/02/2026 </a:t>
+            </a:r>
+            <a:endParaRPr lang="fr-FR" sz="2000" dirty="0"/>
           </a:p>
         </p:txBody>
       </p:sp>
@@ -14825,26 +14830,6 @@
 </file>
 
 <file path=customXml/item1.xml><?xml version="1.0" encoding="utf-8"?>
-<p:properties xmlns:p="http://schemas.microsoft.com/office/2006/metadata/properties" xmlns:xsi="http://www.w3.org/2001/XMLSchema-instance" xmlns:pc="http://schemas.microsoft.com/office/infopath/2007/PartnerControls">
-  <documentManagement>
-    <_ip_UnifiedCompliancePolicyUIAction xmlns="http://schemas.microsoft.com/sharepoint/v3" xsi:nil="true"/>
-    <Image xmlns="71af3243-3dd4-4a8d-8c0d-dd76da1f02a5">
-      <Url xsi:nil="true"/>
-      <Description xsi:nil="true"/>
-    </Image>
-    <Status xmlns="71af3243-3dd4-4a8d-8c0d-dd76da1f02a5">Not started</Status>
-    <Background xmlns="71af3243-3dd4-4a8d-8c0d-dd76da1f02a5">false</Background>
-    <_ip_UnifiedCompliancePolicyProperties xmlns="http://schemas.microsoft.com/sharepoint/v3" xsi:nil="true"/>
-    <ImageTagsTaxHTField xmlns="71af3243-3dd4-4a8d-8c0d-dd76da1f02a5">
-      <Terms xmlns="http://schemas.microsoft.com/office/infopath/2007/PartnerControls"/>
-    </ImageTagsTaxHTField>
-    <TaxCatchAll xmlns="230e9df3-be65-4c73-a93b-d1236ebd677e" xsi:nil="true"/>
-    <MediaServiceKeyPoints xmlns="71af3243-3dd4-4a8d-8c0d-dd76da1f02a5" xsi:nil="true"/>
-  </documentManagement>
-</p:properties>
-</file>
-
-<file path=customXml/item2.xml><?xml version="1.0" encoding="utf-8"?>
 <ct:contentTypeSchema xmlns:ct="http://schemas.microsoft.com/office/2006/metadata/contentType" xmlns:ma="http://schemas.microsoft.com/office/2006/metadata/properties/metaAttributes" ct:_="" ma:_="" ma:contentTypeName="Document" ma:contentTypeID="0x01010079F111ED35F8CC479449609E8A0923A6" ma:contentTypeVersion="28" ma:contentTypeDescription="Create a new document." ma:contentTypeScope="" ma:versionID="60f5a4f2d2b0abadcf532d48ebf9cb71">
   <xsd:schema xmlns:xsd="http://www.w3.org/2001/XMLSchema" xmlns:xs="http://www.w3.org/2001/XMLSchema" xmlns:p="http://schemas.microsoft.com/office/2006/metadata/properties" xmlns:ns1="http://schemas.microsoft.com/sharepoint/v3" xmlns:ns2="71af3243-3dd4-4a8d-8c0d-dd76da1f02a5" xmlns:ns3="16c05727-aa75-4e4a-9b5f-8a80a1165891" xmlns:ns4="230e9df3-be65-4c73-a93b-d1236ebd677e" targetNamespace="http://schemas.microsoft.com/office/2006/metadata/properties" ma:root="true" ma:fieldsID="7dd78129e6a1811f84807ad11c651531" ns1:_="" ns2:_="" ns3:_="" ns4:_="">
     <xsd:import namespace="http://schemas.microsoft.com/sharepoint/v3"/>
@@ -15156,6 +15141,26 @@
 </ct:contentTypeSchema>
 </file>
 
+<file path=customXml/item2.xml><?xml version="1.0" encoding="utf-8"?>
+<p:properties xmlns:p="http://schemas.microsoft.com/office/2006/metadata/properties" xmlns:xsi="http://www.w3.org/2001/XMLSchema-instance" xmlns:pc="http://schemas.microsoft.com/office/infopath/2007/PartnerControls">
+  <documentManagement>
+    <_ip_UnifiedCompliancePolicyUIAction xmlns="http://schemas.microsoft.com/sharepoint/v3" xsi:nil="true"/>
+    <Image xmlns="71af3243-3dd4-4a8d-8c0d-dd76da1f02a5">
+      <Url xsi:nil="true"/>
+      <Description xsi:nil="true"/>
+    </Image>
+    <Status xmlns="71af3243-3dd4-4a8d-8c0d-dd76da1f02a5">Not started</Status>
+    <Background xmlns="71af3243-3dd4-4a8d-8c0d-dd76da1f02a5">false</Background>
+    <_ip_UnifiedCompliancePolicyProperties xmlns="http://schemas.microsoft.com/sharepoint/v3" xsi:nil="true"/>
+    <ImageTagsTaxHTField xmlns="71af3243-3dd4-4a8d-8c0d-dd76da1f02a5">
+      <Terms xmlns="http://schemas.microsoft.com/office/infopath/2007/PartnerControls"/>
+    </ImageTagsTaxHTField>
+    <TaxCatchAll xmlns="230e9df3-be65-4c73-a93b-d1236ebd677e" xsi:nil="true"/>
+    <MediaServiceKeyPoints xmlns="71af3243-3dd4-4a8d-8c0d-dd76da1f02a5" xsi:nil="true"/>
+  </documentManagement>
+</p:properties>
+</file>
+
 <file path=customXml/item3.xml><?xml version="1.0" encoding="utf-8"?>
 <?mso-contentType ?>
 <FormTemplates xmlns="http://schemas.microsoft.com/sharepoint/v3/contenttype/forms">
@@ -15166,18 +15171,6 @@
 </file>
 
 <file path=customXml/itemProps1.xml><?xml version="1.0" encoding="utf-8"?>
-<ds:datastoreItem xmlns:ds="http://schemas.openxmlformats.org/officeDocument/2006/customXml" ds:itemID="{80E87F72-70BF-43BC-A0D4-53665DC12672}">
-  <ds:schemaRefs>
-    <ds:schemaRef ds:uri="http://schemas.microsoft.com/office/2006/metadata/properties"/>
-    <ds:schemaRef ds:uri="http://schemas.microsoft.com/office/infopath/2007/PartnerControls"/>
-    <ds:schemaRef ds:uri="http://schemas.microsoft.com/sharepoint/v3"/>
-    <ds:schemaRef ds:uri="71af3243-3dd4-4a8d-8c0d-dd76da1f02a5"/>
-    <ds:schemaRef ds:uri="230e9df3-be65-4c73-a93b-d1236ebd677e"/>
-  </ds:schemaRefs>
-</ds:datastoreItem>
-</file>
-
-<file path=customXml/itemProps2.xml><?xml version="1.0" encoding="utf-8"?>
 <ds:datastoreItem xmlns:ds="http://schemas.openxmlformats.org/officeDocument/2006/customXml" ds:itemID="{52D646E0-DCC8-4209-B539-AA58186B682C}">
   <ds:schemaRefs>
     <ds:schemaRef ds:uri="http://schemas.microsoft.com/office/2006/metadata/contentType"/>
@@ -15198,6 +15191,18 @@
 </ds:datastoreItem>
 </file>
 
+<file path=customXml/itemProps2.xml><?xml version="1.0" encoding="utf-8"?>
+<ds:datastoreItem xmlns:ds="http://schemas.openxmlformats.org/officeDocument/2006/customXml" ds:itemID="{80E87F72-70BF-43BC-A0D4-53665DC12672}">
+  <ds:schemaRefs>
+    <ds:schemaRef ds:uri="http://schemas.microsoft.com/office/2006/metadata/properties"/>
+    <ds:schemaRef ds:uri="http://schemas.microsoft.com/office/infopath/2007/PartnerControls"/>
+    <ds:schemaRef ds:uri="http://schemas.microsoft.com/sharepoint/v3"/>
+    <ds:schemaRef ds:uri="71af3243-3dd4-4a8d-8c0d-dd76da1f02a5"/>
+    <ds:schemaRef ds:uri="230e9df3-be65-4c73-a93b-d1236ebd677e"/>
+  </ds:schemaRefs>
+</ds:datastoreItem>
+</file>
+
 <file path=customXml/itemProps3.xml><?xml version="1.0" encoding="utf-8"?>
 <ds:datastoreItem xmlns:ds="http://schemas.openxmlformats.org/officeDocument/2006/customXml" ds:itemID="{FABD9919-8F5A-4B99-83E1-E90FE1DCF2E1}">
   <ds:schemaRefs>

</xml_diff>